<commit_message>
[MT M] Revisioni alla presentazione di Luigi
</commit_message>
<xml_diff>
--- a/Presentazione/Atsilo2/Luigi/Luigi_PresentazioneFinale.pptx
+++ b/Presentazione/Atsilo2/Luigi/Luigi_PresentazioneFinale.pptx
@@ -115,6 +115,63 @@
 </p:presentation>
 </file>
 
+<file path=ppt/commentAuthors.xml><?xml version="1.0" encoding="utf-8"?>
+<p:cmAuthorLst xmlns:a="http://schemas.openxmlformats.org/drawingml/2006/main" xmlns:r="http://schemas.openxmlformats.org/officeDocument/2006/relationships" xmlns:p="http://schemas.openxmlformats.org/presentationml/2006/main">
+  <p:cmAuthor id="0" name="Giulio" initials="GF" lastIdx="6" clrIdx="0"/>
+</p:cmAuthorLst>
+</file>
+
+<file path=ppt/comments/comment1.xml><?xml version="1.0" encoding="utf-8"?>
+<p:cmLst xmlns:a="http://schemas.openxmlformats.org/drawingml/2006/main" xmlns:r="http://schemas.openxmlformats.org/officeDocument/2006/relationships" xmlns:p="http://schemas.openxmlformats.org/presentationml/2006/main">
+  <p:cm authorId="0" dt="2012-12-30T14:51:20.928" idx="1">
+    <p:pos x="1963" y="1355"/>
+    <p:text>engineering con 2 e</p:text>
+  </p:cm>
+  <p:cm authorId="0" dt="2012-12-30T14:52:12.551" idx="2">
+    <p:pos x="5127" y="1582"/>
+    <p:text>Il db lo avete iniziato a fare dal SDD</p:text>
+  </p:cm>
+</p:cmLst>
+</file>
+
+<file path=ppt/comments/comment2.xml><?xml version="1.0" encoding="utf-8"?>
+<p:cmLst xmlns:a="http://schemas.openxmlformats.org/drawingml/2006/main" xmlns:r="http://schemas.openxmlformats.org/officeDocument/2006/relationships" xmlns:p="http://schemas.openxmlformats.org/presentationml/2006/main">
+  <p:cm authorId="0" dt="2012-12-30T14:53:02.823" idx="3">
+    <p:pos x="10" y="10"/>
+    <p:text>E' interessante, ma non so se altri lo dicono già. Controlla le bozze degli altri.</p:text>
+  </p:cm>
+</p:cmLst>
+</file>
+
+<file path=ppt/comments/comment3.xml><?xml version="1.0" encoding="utf-8"?>
+<p:cmLst xmlns:a="http://schemas.openxmlformats.org/drawingml/2006/main" xmlns:r="http://schemas.openxmlformats.org/officeDocument/2006/relationships" xmlns:p="http://schemas.openxmlformats.org/presentationml/2006/main">
+  <p:cm authorId="0" dt="2012-12-30T14:55:09.304" idx="4">
+    <p:pos x="10" y="10"/>
+    <p:text>Cerca di essere più schematico. Se vuoi dire qualcosa, ma non lo vuoi mettere sulla slide, lo puoi scrivere sotto, nell'area delle note, che compaiono solo a te in fase di presentazione.
+Devi trattare anche le associazioni 1-n
+Per tutti i tipi di mapping, fai anche qualche esempio, con ER astratto, ER di basso livello, e UML dell'implementazione.</p:text>
+  </p:cm>
+</p:cmLst>
+</file>
+
+<file path=ppt/comments/comment4.xml><?xml version="1.0" encoding="utf-8"?>
+<p:cmLst xmlns:a="http://schemas.openxmlformats.org/drawingml/2006/main" xmlns:r="http://schemas.openxmlformats.org/officeDocument/2006/relationships" xmlns:p="http://schemas.openxmlformats.org/presentationml/2006/main">
+  <p:cm authorId="0" dt="2012-12-30T14:56:19.819" idx="5">
+    <p:pos x="10" y="10"/>
+    <p:text>Anche qui, per l'esempio, basati su diagrammi a vari livelli (qui puoi partire addirittura dalla gerarchia iniziale degli attori, e far vedere tutta l'evoluzione).</p:text>
+  </p:cm>
+</p:cmLst>
+</file>
+
+<file path=ppt/comments/comment5.xml><?xml version="1.0" encoding="utf-8"?>
+<p:cmLst xmlns:a="http://schemas.openxmlformats.org/drawingml/2006/main" xmlns:r="http://schemas.openxmlformats.org/officeDocument/2006/relationships" xmlns:p="http://schemas.openxmlformats.org/presentationml/2006/main">
+  <p:cm authorId="0" dt="2012-12-30T15:07:25.502" idx="6">
+    <p:pos x="10" y="10"/>
+    <p:text>Ti conviene mettere meno classi, ma più zoomate. Eventualmente, se i primi di Gennaio venite all'università, potrei portare il proiettore, così iniziamo a provare se è leggibile.</p:text>
+  </p:cm>
+</p:cmLst>
+</file>
+
 <file path=ppt/notesMasters/notesMaster1.xml><?xml version="1.0" encoding="utf-8"?>
 <p:notesMaster xmlns:a="http://schemas.openxmlformats.org/drawingml/2006/main" xmlns:r="http://schemas.openxmlformats.org/officeDocument/2006/relationships" xmlns:p="http://schemas.openxmlformats.org/presentationml/2006/main">
   <p:cSld>
@@ -197,7 +254,8 @@
           <a:p>
             <a:fld id="{38D78F4D-402C-46E0-A4BB-DF91EA86B14C}" type="datetimeFigureOut">
               <a:rPr lang="it-IT" smtClean="0"/>
-              <a:t>29/12/2012</a:t>
+              <a:pPr/>
+              <a:t>30/12/2012</a:t>
             </a:fld>
             <a:endParaRPr lang="it-IT"/>
           </a:p>
@@ -356,6 +414,7 @@
           <a:p>
             <a:fld id="{D70604CA-7593-4640-8FA1-5523937B8510}" type="slidenum">
               <a:rPr lang="it-IT" smtClean="0"/>
+              <a:pPr/>
               <a:t>‹N›</a:t>
             </a:fld>
             <a:endParaRPr lang="it-IT"/>
@@ -365,7 +424,7 @@
     </p:spTree>
     <p:extLst>
       <p:ext uri="{BB962C8B-B14F-4D97-AF65-F5344CB8AC3E}">
-        <p14:creationId xmlns:p14="http://schemas.microsoft.com/office/powerpoint/2010/main" val="2126419590"/>
+        <p14:creationId xmlns:p14="http://schemas.microsoft.com/office/powerpoint/2010/main" xmlns="" val="2126419590"/>
       </p:ext>
     </p:extLst>
   </p:cSld>
@@ -630,7 +689,8 @@
           <a:p>
             <a:fld id="{63CABBC0-75E4-43BB-A6A6-84C2A96BDB82}" type="datetimeFigureOut">
               <a:rPr lang="it-IT" smtClean="0"/>
-              <a:t>29/12/2012</a:t>
+              <a:pPr/>
+              <a:t>30/12/2012</a:t>
             </a:fld>
             <a:endParaRPr lang="it-IT"/>
           </a:p>
@@ -672,6 +732,7 @@
           <a:p>
             <a:fld id="{F89AEA99-3E91-4C58-9AD4-045DB5619AC3}" type="slidenum">
               <a:rPr lang="it-IT" smtClean="0"/>
+              <a:pPr/>
               <a:t>‹N›</a:t>
             </a:fld>
             <a:endParaRPr lang="it-IT"/>
@@ -810,7 +871,8 @@
           <a:p>
             <a:fld id="{63CABBC0-75E4-43BB-A6A6-84C2A96BDB82}" type="datetimeFigureOut">
               <a:rPr lang="it-IT" smtClean="0"/>
-              <a:t>29/12/2012</a:t>
+              <a:pPr/>
+              <a:t>30/12/2012</a:t>
             </a:fld>
             <a:endParaRPr lang="it-IT"/>
           </a:p>
@@ -852,6 +914,7 @@
           <a:p>
             <a:fld id="{F89AEA99-3E91-4C58-9AD4-045DB5619AC3}" type="slidenum">
               <a:rPr lang="it-IT" smtClean="0"/>
+              <a:pPr/>
               <a:t>‹N›</a:t>
             </a:fld>
             <a:endParaRPr lang="it-IT"/>
@@ -1000,7 +1063,8 @@
           <a:p>
             <a:fld id="{63CABBC0-75E4-43BB-A6A6-84C2A96BDB82}" type="datetimeFigureOut">
               <a:rPr lang="it-IT" smtClean="0"/>
-              <a:t>29/12/2012</a:t>
+              <a:pPr/>
+              <a:t>30/12/2012</a:t>
             </a:fld>
             <a:endParaRPr lang="it-IT"/>
           </a:p>
@@ -1042,6 +1106,7 @@
           <a:p>
             <a:fld id="{F89AEA99-3E91-4C58-9AD4-045DB5619AC3}" type="slidenum">
               <a:rPr lang="it-IT" smtClean="0"/>
+              <a:pPr/>
               <a:t>‹N›</a:t>
             </a:fld>
             <a:endParaRPr lang="it-IT"/>
@@ -1180,7 +1245,8 @@
           <a:p>
             <a:fld id="{63CABBC0-75E4-43BB-A6A6-84C2A96BDB82}" type="datetimeFigureOut">
               <a:rPr lang="it-IT" smtClean="0"/>
-              <a:t>29/12/2012</a:t>
+              <a:pPr/>
+              <a:t>30/12/2012</a:t>
             </a:fld>
             <a:endParaRPr lang="it-IT"/>
           </a:p>
@@ -1222,6 +1288,7 @@
           <a:p>
             <a:fld id="{F89AEA99-3E91-4C58-9AD4-045DB5619AC3}" type="slidenum">
               <a:rPr lang="it-IT" smtClean="0"/>
+              <a:pPr/>
               <a:t>‹N›</a:t>
             </a:fld>
             <a:endParaRPr lang="it-IT"/>
@@ -1421,7 +1488,8 @@
           <a:p>
             <a:fld id="{63CABBC0-75E4-43BB-A6A6-84C2A96BDB82}" type="datetimeFigureOut">
               <a:rPr lang="it-IT" smtClean="0"/>
-              <a:t>29/12/2012</a:t>
+              <a:pPr/>
+              <a:t>30/12/2012</a:t>
             </a:fld>
             <a:endParaRPr lang="it-IT"/>
           </a:p>
@@ -1463,6 +1531,7 @@
           <a:p>
             <a:fld id="{F89AEA99-3E91-4C58-9AD4-045DB5619AC3}" type="slidenum">
               <a:rPr lang="it-IT" smtClean="0"/>
+              <a:pPr/>
               <a:t>‹N›</a:t>
             </a:fld>
             <a:endParaRPr lang="it-IT"/>
@@ -1700,7 +1769,8 @@
           <a:p>
             <a:fld id="{63CABBC0-75E4-43BB-A6A6-84C2A96BDB82}" type="datetimeFigureOut">
               <a:rPr lang="it-IT" smtClean="0"/>
-              <a:t>29/12/2012</a:t>
+              <a:pPr/>
+              <a:t>30/12/2012</a:t>
             </a:fld>
             <a:endParaRPr lang="it-IT"/>
           </a:p>
@@ -1742,6 +1812,7 @@
           <a:p>
             <a:fld id="{F89AEA99-3E91-4C58-9AD4-045DB5619AC3}" type="slidenum">
               <a:rPr lang="it-IT" smtClean="0"/>
+              <a:pPr/>
               <a:t>‹N›</a:t>
             </a:fld>
             <a:endParaRPr lang="it-IT"/>
@@ -2089,7 +2160,8 @@
           <a:p>
             <a:fld id="{63CABBC0-75E4-43BB-A6A6-84C2A96BDB82}" type="datetimeFigureOut">
               <a:rPr lang="it-IT" smtClean="0"/>
-              <a:t>29/12/2012</a:t>
+              <a:pPr/>
+              <a:t>30/12/2012</a:t>
             </a:fld>
             <a:endParaRPr lang="it-IT"/>
           </a:p>
@@ -2131,6 +2203,7 @@
           <a:p>
             <a:fld id="{F89AEA99-3E91-4C58-9AD4-045DB5619AC3}" type="slidenum">
               <a:rPr lang="it-IT" smtClean="0"/>
+              <a:pPr/>
               <a:t>‹N›</a:t>
             </a:fld>
             <a:endParaRPr lang="it-IT"/>
@@ -2246,7 +2319,8 @@
           <a:p>
             <a:fld id="{63CABBC0-75E4-43BB-A6A6-84C2A96BDB82}" type="datetimeFigureOut">
               <a:rPr lang="it-IT" smtClean="0"/>
-              <a:t>29/12/2012</a:t>
+              <a:pPr/>
+              <a:t>30/12/2012</a:t>
             </a:fld>
             <a:endParaRPr lang="it-IT"/>
           </a:p>
@@ -2288,6 +2362,7 @@
           <a:p>
             <a:fld id="{F89AEA99-3E91-4C58-9AD4-045DB5619AC3}" type="slidenum">
               <a:rPr lang="it-IT" smtClean="0"/>
+              <a:pPr/>
               <a:t>‹N›</a:t>
             </a:fld>
             <a:endParaRPr lang="it-IT"/>
@@ -2343,7 +2418,8 @@
           <a:p>
             <a:fld id="{63CABBC0-75E4-43BB-A6A6-84C2A96BDB82}" type="datetimeFigureOut">
               <a:rPr lang="it-IT" smtClean="0"/>
-              <a:t>29/12/2012</a:t>
+              <a:pPr/>
+              <a:t>30/12/2012</a:t>
             </a:fld>
             <a:endParaRPr lang="it-IT"/>
           </a:p>
@@ -2385,6 +2461,7 @@
           <a:p>
             <a:fld id="{F89AEA99-3E91-4C58-9AD4-045DB5619AC3}" type="slidenum">
               <a:rPr lang="it-IT" smtClean="0"/>
+              <a:pPr/>
               <a:t>‹N›</a:t>
             </a:fld>
             <a:endParaRPr lang="it-IT"/>
@@ -2611,7 +2688,8 @@
           <a:p>
             <a:fld id="{63CABBC0-75E4-43BB-A6A6-84C2A96BDB82}" type="datetimeFigureOut">
               <a:rPr lang="it-IT" smtClean="0"/>
-              <a:t>29/12/2012</a:t>
+              <a:pPr/>
+              <a:t>30/12/2012</a:t>
             </a:fld>
             <a:endParaRPr lang="it-IT"/>
           </a:p>
@@ -2653,6 +2731,7 @@
           <a:p>
             <a:fld id="{F89AEA99-3E91-4C58-9AD4-045DB5619AC3}" type="slidenum">
               <a:rPr lang="it-IT" smtClean="0"/>
+              <a:pPr/>
               <a:t>‹N›</a:t>
             </a:fld>
             <a:endParaRPr lang="it-IT"/>
@@ -2906,7 +2985,8 @@
           <a:p>
             <a:fld id="{63CABBC0-75E4-43BB-A6A6-84C2A96BDB82}" type="datetimeFigureOut">
               <a:rPr lang="it-IT" smtClean="0"/>
-              <a:t>29/12/2012</a:t>
+              <a:pPr/>
+              <a:t>30/12/2012</a:t>
             </a:fld>
             <a:endParaRPr lang="it-IT"/>
           </a:p>
@@ -2953,6 +3033,7 @@
           <a:p>
             <a:fld id="{F89AEA99-3E91-4C58-9AD4-045DB5619AC3}" type="slidenum">
               <a:rPr lang="it-IT" smtClean="0"/>
+              <a:pPr/>
               <a:t>‹N›</a:t>
             </a:fld>
             <a:endParaRPr lang="it-IT"/>
@@ -3684,7 +3765,8 @@
           <a:p>
             <a:fld id="{63CABBC0-75E4-43BB-A6A6-84C2A96BDB82}" type="datetimeFigureOut">
               <a:rPr lang="it-IT" smtClean="0"/>
-              <a:t>29/12/2012</a:t>
+              <a:pPr/>
+              <a:t>30/12/2012</a:t>
             </a:fld>
             <a:endParaRPr lang="it-IT"/>
           </a:p>
@@ -3762,6 +3844,7 @@
           <a:p>
             <a:fld id="{F89AEA99-3E91-4C58-9AD4-045DB5619AC3}" type="slidenum">
               <a:rPr lang="it-IT" smtClean="0"/>
+              <a:pPr/>
               <a:t>‹N›</a:t>
             </a:fld>
             <a:endParaRPr lang="it-IT"/>
@@ -4366,14 +4449,14 @@
           <p:nvPr>
             <p:extLst>
               <p:ext uri="{D42A27DB-BD31-4B8C-83A1-F6EECF244321}">
-                <p14:modId xmlns:p14="http://schemas.microsoft.com/office/powerpoint/2010/main" val="3478576524"/>
+                <p14:modId xmlns:p14="http://schemas.microsoft.com/office/powerpoint/2010/main" xmlns="" val="3478576524"/>
               </p:ext>
             </p:extLst>
           </p:nvPr>
         </p:nvGraphicFramePr>
         <p:xfrm>
-          <a:off x="29313" y="5042215"/>
-          <a:ext cx="2051720" cy="1981200"/>
+          <a:off x="179512" y="5517232"/>
+          <a:ext cx="2051720" cy="1188720"/>
         </p:xfrm>
         <a:graphic>
           <a:graphicData uri="http://schemas.openxmlformats.org/drawingml/2006/table">
@@ -4436,7 +4519,13 @@
                         <a:rPr lang="it-IT" sz="1400" dirty="0" smtClean="0">
                           <a:effectLst/>
                         </a:rPr>
-                        <a:t>..</a:t>
+                        <a:t>Luigi </a:t>
+                      </a:r>
+                      <a:r>
+                        <a:rPr lang="it-IT" sz="1400" dirty="0" err="1" smtClean="0">
+                          <a:effectLst/>
+                        </a:rPr>
+                        <a:t>Lomasto</a:t>
                       </a:r>
                       <a:endParaRPr lang="it-IT" sz="1400" dirty="0">
                         <a:effectLst/>
@@ -4461,57 +4550,7 @@
                         <a:rPr lang="it-IT" sz="1400" dirty="0" smtClean="0">
                           <a:effectLst/>
                         </a:rPr>
-                        <a:t>..</a:t>
-                      </a:r>
-                      <a:endParaRPr lang="it-IT" sz="1400" dirty="0">
-                        <a:effectLst/>
-                      </a:endParaRPr>
-                    </a:p>
-                  </a:txBody>
-                  <a:tcPr marL="38100" marR="38100" marT="38100" marB="38100"/>
-                </a:tc>
-              </a:tr>
-              <a:tr h="0">
-                <a:tc>
-                  <a:txBody>
-                    <a:bodyPr/>
-                    <a:lstStyle/>
-                    <a:p>
-                      <a:pPr algn="ctr" rtl="0">
-                        <a:lnSpc>
-                          <a:spcPct val="150000"/>
-                        </a:lnSpc>
-                      </a:pPr>
-                      <a:r>
-                        <a:rPr lang="it-IT" sz="1400" dirty="0" smtClean="0">
-                          <a:effectLst/>
-                        </a:rPr>
-                        <a:t>..</a:t>
-                      </a:r>
-                      <a:endParaRPr lang="it-IT" sz="1400" dirty="0">
-                        <a:effectLst/>
-                      </a:endParaRPr>
-                    </a:p>
-                  </a:txBody>
-                  <a:tcPr marL="38100" marR="38100" marT="38100" marB="38100"/>
-                </a:tc>
-              </a:tr>
-              <a:tr h="0">
-                <a:tc>
-                  <a:txBody>
-                    <a:bodyPr/>
-                    <a:lstStyle/>
-                    <a:p>
-                      <a:pPr algn="ctr" rtl="0">
-                        <a:lnSpc>
-                          <a:spcPct val="150000"/>
-                        </a:lnSpc>
-                      </a:pPr>
-                      <a:r>
-                        <a:rPr lang="it-IT" sz="1400" dirty="0" smtClean="0">
-                          <a:effectLst/>
-                        </a:rPr>
-                        <a:t>..</a:t>
+                        <a:t>&lt;matricola qui&gt;</a:t>
                       </a:r>
                       <a:endParaRPr lang="it-IT" sz="1400" dirty="0">
                         <a:effectLst/>
@@ -4534,13 +4573,13 @@
           <p:nvPr>
             <p:extLst>
               <p:ext uri="{D42A27DB-BD31-4B8C-83A1-F6EECF244321}">
-                <p14:modId xmlns:p14="http://schemas.microsoft.com/office/powerpoint/2010/main" val="3696521689"/>
+                <p14:modId xmlns:p14="http://schemas.microsoft.com/office/powerpoint/2010/main" xmlns="" val="3696521689"/>
               </p:ext>
             </p:extLst>
           </p:nvPr>
         </p:nvGraphicFramePr>
         <p:xfrm>
-          <a:off x="7092280" y="6060793"/>
+          <a:off x="6948264" y="5877272"/>
           <a:ext cx="2051720" cy="792480"/>
         </p:xfrm>
         <a:graphic>
@@ -4621,10 +4660,10 @@
           <p:nvPr/>
         </p:nvPicPr>
         <p:blipFill>
-          <a:blip r:embed="rId2">
+          <a:blip r:embed="rId2" cstate="print">
             <a:extLst>
               <a:ext uri="{28A0092B-C50C-407E-A947-70E740481C1C}">
-                <a14:useLocalDpi xmlns:a14="http://schemas.microsoft.com/office/drawing/2010/main" val="0"/>
+                <a14:useLocalDpi xmlns:a14="http://schemas.microsoft.com/office/drawing/2010/main" xmlns="" val="0"/>
               </a:ext>
             </a:extLst>
           </a:blip>
@@ -4644,7 +4683,7 @@
           <a:noFill/>
           <a:extLst>
             <a:ext uri="{909E8E84-426E-40DD-AFC4-6F175D3DCCD1}">
-              <a14:hiddenFill xmlns:a14="http://schemas.microsoft.com/office/drawing/2010/main">
+              <a14:hiddenFill xmlns:a14="http://schemas.microsoft.com/office/drawing/2010/main" xmlns="">
                 <a:solidFill>
                   <a:srgbClr val="FFFFFF"/>
                 </a:solidFill>
@@ -4656,7 +4695,7 @@
     </p:spTree>
     <p:extLst>
       <p:ext uri="{BB962C8B-B14F-4D97-AF65-F5344CB8AC3E}">
-        <p14:creationId xmlns:p14="http://schemas.microsoft.com/office/powerpoint/2010/main" val="4165334171"/>
+        <p14:creationId xmlns:p14="http://schemas.microsoft.com/office/powerpoint/2010/main" xmlns="" val="4165334171"/>
       </p:ext>
     </p:extLst>
   </p:cSld>
@@ -5090,10 +5129,10 @@
           <p:nvPr/>
         </p:nvPicPr>
         <p:blipFill>
-          <a:blip r:embed="rId2">
+          <a:blip r:embed="rId2" cstate="print">
             <a:extLst>
               <a:ext uri="{28A0092B-C50C-407E-A947-70E740481C1C}">
-                <a14:useLocalDpi xmlns:a14="http://schemas.microsoft.com/office/drawing/2010/main" val="0"/>
+                <a14:useLocalDpi xmlns:a14="http://schemas.microsoft.com/office/drawing/2010/main" xmlns="" val="0"/>
               </a:ext>
             </a:extLst>
           </a:blip>
@@ -5114,18 +5153,18 @@
     </p:spTree>
     <p:extLst>
       <p:ext uri="{BB962C8B-B14F-4D97-AF65-F5344CB8AC3E}">
-        <p14:creationId xmlns:p14="http://schemas.microsoft.com/office/powerpoint/2010/main" val="155874689"/>
+        <p14:creationId xmlns:p14="http://schemas.microsoft.com/office/powerpoint/2010/main" xmlns="" val="155874689"/>
       </p:ext>
     </p:extLst>
   </p:cSld>
   <p:clrMapOvr>
     <a:masterClrMapping/>
   </p:clrMapOvr>
-  <mc:AlternateContent xmlns:mc="http://schemas.openxmlformats.org/markup-compatibility/2006" xmlns:p14="http://schemas.microsoft.com/office/powerpoint/2010/main">
-    <mc:Choice Requires="p14">
+  <mc:AlternateContent xmlns:mc="http://schemas.openxmlformats.org/markup-compatibility/2006">
+    <mc:Choice xmlns:p14="http://schemas.microsoft.com/office/powerpoint/2010/main" xmlns="" Requires="p14">
       <p:transition spd="slow" p14:dur="2000"/>
     </mc:Choice>
-    <mc:Fallback xmlns="">
+    <mc:Fallback>
       <p:transition spd="slow"/>
     </mc:Fallback>
   </mc:AlternateContent>
@@ -5312,7 +5351,7 @@
     </p:spTree>
     <p:extLst>
       <p:ext uri="{BB962C8B-B14F-4D97-AF65-F5344CB8AC3E}">
-        <p14:creationId xmlns:p14="http://schemas.microsoft.com/office/powerpoint/2010/main" val="335055555"/>
+        <p14:creationId xmlns:p14="http://schemas.microsoft.com/office/powerpoint/2010/main" xmlns="" val="335055555"/>
       </p:ext>
     </p:extLst>
   </p:cSld>
@@ -5483,7 +5522,7 @@
     </p:spTree>
     <p:extLst>
       <p:ext uri="{BB962C8B-B14F-4D97-AF65-F5344CB8AC3E}">
-        <p14:creationId xmlns:p14="http://schemas.microsoft.com/office/powerpoint/2010/main" val="2479304105"/>
+        <p14:creationId xmlns:p14="http://schemas.microsoft.com/office/powerpoint/2010/main" xmlns="" val="2479304105"/>
       </p:ext>
     </p:extLst>
   </p:cSld>
@@ -5539,9 +5578,6 @@
               </a:rPr>
               <a:t>Ereditarietà </a:t>
             </a:r>
-            <a:endParaRPr lang="it-IT" sz="3200" b="1" dirty="0" smtClean="0">
-              <a:latin typeface="+mj-lt"/>
-            </a:endParaRPr>
           </a:p>
           <a:p>
             <a:pPr algn="ctr"/>
@@ -5612,7 +5648,7 @@
     </p:spTree>
     <p:extLst>
       <p:ext uri="{BB962C8B-B14F-4D97-AF65-F5344CB8AC3E}">
-        <p14:creationId xmlns:p14="http://schemas.microsoft.com/office/powerpoint/2010/main" val="1080303246"/>
+        <p14:creationId xmlns:p14="http://schemas.microsoft.com/office/powerpoint/2010/main" xmlns="" val="1080303246"/>
       </p:ext>
     </p:extLst>
   </p:cSld>
@@ -5648,10 +5684,10 @@
           <p:nvPr/>
         </p:nvPicPr>
         <p:blipFill>
-          <a:blip r:embed="rId2">
+          <a:blip r:embed="rId2" cstate="print">
             <a:extLst>
               <a:ext uri="{28A0092B-C50C-407E-A947-70E740481C1C}">
-                <a14:useLocalDpi xmlns:a14="http://schemas.microsoft.com/office/drawing/2010/main" val="0"/>
+                <a14:useLocalDpi xmlns:a14="http://schemas.microsoft.com/office/drawing/2010/main" xmlns="" val="0"/>
               </a:ext>
             </a:extLst>
           </a:blip>
@@ -5672,7 +5708,7 @@
     </p:spTree>
     <p:extLst>
       <p:ext uri="{BB962C8B-B14F-4D97-AF65-F5344CB8AC3E}">
-        <p14:creationId xmlns:p14="http://schemas.microsoft.com/office/powerpoint/2010/main" val="551819198"/>
+        <p14:creationId xmlns:p14="http://schemas.microsoft.com/office/powerpoint/2010/main" xmlns="" val="551819198"/>
       </p:ext>
     </p:extLst>
   </p:cSld>

</xml_diff>